<commit_message>
Changing to new affiliation.
</commit_message>
<xml_diff>
--- a/docs/simpleitkFundamentalConcepts.pptx
+++ b/docs/simpleitkFundamentalConcepts.pptx
@@ -266,7 +266,7 @@
               <a:pPr>
                 <a:defRPr/>
               </a:pPr>
-              <a:t>12/11/18</a:t>
+              <a:t>1/8/19</a:t>
             </a:fld>
             <a:endParaRPr lang="en-US"/>
           </a:p>
@@ -469,7 +469,7 @@
               <a:pPr>
                 <a:defRPr/>
               </a:pPr>
-              <a:t>12/11/18</a:t>
+              <a:t>1/8/19</a:t>
             </a:fld>
             <a:endParaRPr lang="en-US"/>
           </a:p>
@@ -983,7 +983,7 @@
               <a:pPr>
                 <a:defRPr/>
               </a:pPr>
-              <a:t>12/11/18</a:t>
+              <a:t>1/8/19</a:t>
             </a:fld>
             <a:endParaRPr lang="en-US"/>
           </a:p>
@@ -1178,7 +1178,7 @@
               <a:pPr>
                 <a:defRPr/>
               </a:pPr>
-              <a:t>12/11/18</a:t>
+              <a:t>1/8/19</a:t>
             </a:fld>
             <a:endParaRPr lang="en-US"/>
           </a:p>
@@ -1383,7 +1383,7 @@
               <a:pPr>
                 <a:defRPr/>
               </a:pPr>
-              <a:t>12/11/18</a:t>
+              <a:t>1/8/19</a:t>
             </a:fld>
             <a:endParaRPr lang="en-US"/>
           </a:p>
@@ -1647,7 +1647,7 @@
               <a:pPr>
                 <a:defRPr/>
               </a:pPr>
-              <a:t>12/11/18</a:t>
+              <a:t>1/8/19</a:t>
             </a:fld>
             <a:endParaRPr lang="en-US"/>
           </a:p>
@@ -1919,7 +1919,7 @@
               <a:pPr>
                 <a:defRPr/>
               </a:pPr>
-              <a:t>12/11/18</a:t>
+              <a:t>1/8/19</a:t>
             </a:fld>
             <a:endParaRPr lang="en-US"/>
           </a:p>
@@ -2300,7 +2300,7 @@
               <a:pPr>
                 <a:defRPr/>
               </a:pPr>
-              <a:t>12/11/18</a:t>
+              <a:t>1/8/19</a:t>
             </a:fld>
             <a:endParaRPr lang="en-US"/>
           </a:p>
@@ -2815,7 +2815,7 @@
               <a:pPr>
                 <a:defRPr/>
               </a:pPr>
-              <a:t>12/11/18</a:t>
+              <a:t>1/8/19</a:t>
             </a:fld>
             <a:endParaRPr lang="en-US"/>
           </a:p>
@@ -3028,7 +3028,7 @@
               <a:pPr>
                 <a:defRPr/>
               </a:pPr>
-              <a:t>12/11/18</a:t>
+              <a:t>1/8/19</a:t>
             </a:fld>
             <a:endParaRPr lang="en-US"/>
           </a:p>
@@ -3150,7 +3150,7 @@
               <a:pPr>
                 <a:defRPr/>
               </a:pPr>
-              <a:t>12/11/18</a:t>
+              <a:t>1/8/19</a:t>
             </a:fld>
             <a:endParaRPr lang="en-US"/>
           </a:p>
@@ -3452,7 +3452,7 @@
               <a:pPr>
                 <a:defRPr/>
               </a:pPr>
-              <a:t>12/11/18</a:t>
+              <a:t>1/8/19</a:t>
             </a:fld>
             <a:endParaRPr lang="en-US"/>
           </a:p>
@@ -3734,7 +3734,7 @@
               <a:pPr>
                 <a:defRPr/>
               </a:pPr>
-              <a:t>12/11/18</a:t>
+              <a:t>1/8/19</a:t>
             </a:fld>
             <a:endParaRPr lang="en-US"/>
           </a:p>
@@ -4050,7 +4050,7 @@
               <a:pPr>
                 <a:defRPr/>
               </a:pPr>
-              <a:t>12/11/18</a:t>
+              <a:t>1/8/19</a:t>
             </a:fld>
             <a:endParaRPr lang="en-US"/>
           </a:p>
@@ -6153,6 +6153,17 @@
               </a:lnSpc>
             </a:pPr>
             <a:r>
+              <a:rPr lang="en-US" sz="2000" dirty="0">
+                <a:solidFill>
+                  <a:schemeClr val="tx1"/>
+                </a:solidFill>
+                <a:latin typeface="Arial" charset="0"/>
+                <a:ea typeface="ＭＳ Ｐゴシック" pitchFamily="34" charset="-128"/>
+                <a:cs typeface="Arial" charset="0"/>
+              </a:rPr>
+              <a:t>Ziv Yaniv</a:t>
+            </a:r>
+            <a:r>
               <a:rPr lang="en-US" sz="2000" baseline="30000" dirty="0">
                 <a:solidFill>
                   <a:schemeClr val="tx1"/>
@@ -6172,7 +6183,7 @@
                 <a:ea typeface="ＭＳ Ｐゴシック" pitchFamily="34" charset="-128"/>
                 <a:cs typeface="Arial" charset="0"/>
               </a:rPr>
-              <a:t>Ziv Yaniv , </a:t>
+              <a:t> , Bradley C. Lowekamp</a:t>
             </a:r>
             <a:r>
               <a:rPr lang="en-US" sz="2000" baseline="30000" dirty="0">
@@ -6183,29 +6194,7 @@
                 <a:ea typeface="ＭＳ Ｐゴシック" pitchFamily="34" charset="-128"/>
                 <a:cs typeface="Arial" charset="0"/>
               </a:rPr>
-              <a:t>1,3</a:t>
-            </a:r>
-            <a:r>
-              <a:rPr lang="en-US" sz="2000" dirty="0">
-                <a:solidFill>
-                  <a:schemeClr val="tx1"/>
-                </a:solidFill>
-                <a:latin typeface="Arial" charset="0"/>
-                <a:ea typeface="ＭＳ Ｐゴシック" pitchFamily="34" charset="-128"/>
-                <a:cs typeface="Arial" charset="0"/>
-              </a:rPr>
-              <a:t>Bradley C. </a:t>
-            </a:r>
-            <a:r>
-              <a:rPr lang="en-US" sz="2000" dirty="0" err="1">
-                <a:solidFill>
-                  <a:schemeClr val="tx1"/>
-                </a:solidFill>
-                <a:latin typeface="Arial" charset="0"/>
-                <a:ea typeface="ＭＳ Ｐゴシック" pitchFamily="34" charset="-128"/>
-                <a:cs typeface="Arial" charset="0"/>
-              </a:rPr>
-              <a:t>Lowekamp</a:t>
+              <a:t>1,2</a:t>
             </a:r>
             <a:endParaRPr lang="en-US" sz="2000" dirty="0">
               <a:solidFill>
@@ -6289,44 +6278,7 @@
                 <a:ea typeface="ＭＳ Ｐゴシック" pitchFamily="34" charset="-128"/>
                 <a:cs typeface="Arial" charset="0"/>
               </a:rPr>
-              <a:t>TAJ Technologies Inc.</a:t>
-            </a:r>
-            <a:endParaRPr lang="en-US" sz="800" dirty="0">
-              <a:solidFill>
-                <a:schemeClr val="tx1"/>
-              </a:solidFill>
-              <a:latin typeface="Arial" charset="0"/>
-              <a:ea typeface="ＭＳ Ｐゴシック" pitchFamily="34" charset="-128"/>
-              <a:cs typeface="Arial" charset="0"/>
-            </a:endParaRPr>
-          </a:p>
-          <a:p>
-            <a:pPr eaLnBrk="1" hangingPunct="1">
-              <a:lnSpc>
-                <a:spcPct val="80000"/>
-              </a:lnSpc>
-            </a:pPr>
-            <a:r>
-              <a:rPr lang="en-US" sz="2000" baseline="30000" dirty="0">
-                <a:solidFill>
-                  <a:schemeClr val="tx1"/>
-                </a:solidFill>
-                <a:latin typeface="Arial" charset="0"/>
-                <a:ea typeface="ＭＳ Ｐゴシック" pitchFamily="34" charset="-128"/>
-                <a:cs typeface="Arial" charset="0"/>
-              </a:rPr>
-              <a:t>3</a:t>
-            </a:r>
-            <a:r>
-              <a:rPr lang="en-US" sz="2000" dirty="0">
-                <a:solidFill>
-                  <a:schemeClr val="tx1"/>
-                </a:solidFill>
-                <a:latin typeface="Arial" charset="0"/>
-                <a:ea typeface="ＭＳ Ｐゴシック" pitchFamily="34" charset="-128"/>
-                <a:cs typeface="Arial" charset="0"/>
-              </a:rPr>
-              <a:t>MSC LLC</a:t>
+              <a:t>Medical Science and Computing LLC</a:t>
             </a:r>
           </a:p>
           <a:p>
@@ -6348,66 +6300,6 @@
       </p:sp>
       <p:pic>
         <p:nvPicPr>
-          <p:cNvPr id="8" name="Picture 7" descr="nlm.png"/>
-          <p:cNvPicPr>
-            <a:picLocks noChangeAspect="1"/>
-          </p:cNvPicPr>
-          <p:nvPr/>
-        </p:nvPicPr>
-        <p:blipFill>
-          <a:blip r:embed="rId2" cstate="print">
-            <a:extLst>
-              <a:ext uri="{28A0092B-C50C-407E-A947-70E740481C1C}">
-                <a14:useLocalDpi xmlns:a14="http://schemas.microsoft.com/office/drawing/2010/main" val="0"/>
-              </a:ext>
-            </a:extLst>
-          </a:blip>
-          <a:stretch>
-            <a:fillRect/>
-          </a:stretch>
-        </p:blipFill>
-        <p:spPr>
-          <a:xfrm>
-            <a:off x="1266458" y="3854406"/>
-            <a:ext cx="1763592" cy="1289096"/>
-          </a:xfrm>
-          <a:prstGeom prst="rect">
-            <a:avLst/>
-          </a:prstGeom>
-        </p:spPr>
-      </p:pic>
-      <p:pic>
-        <p:nvPicPr>
-          <p:cNvPr id="11" name="Picture 10"/>
-          <p:cNvPicPr>
-            <a:picLocks noChangeAspect="1"/>
-          </p:cNvPicPr>
-          <p:nvPr/>
-        </p:nvPicPr>
-        <p:blipFill>
-          <a:blip r:embed="rId3" cstate="print">
-            <a:extLst>
-              <a:ext uri="{28A0092B-C50C-407E-A947-70E740481C1C}">
-                <a14:useLocalDpi xmlns:a14="http://schemas.microsoft.com/office/drawing/2010/main" val="0"/>
-              </a:ext>
-            </a:extLst>
-          </a:blip>
-          <a:stretch>
-            <a:fillRect/>
-          </a:stretch>
-        </p:blipFill>
-        <p:spPr>
-          <a:xfrm>
-            <a:off x="4296508" y="4159950"/>
-            <a:ext cx="685800" cy="678008"/>
-          </a:xfrm>
-          <a:prstGeom prst="rect">
-            <a:avLst/>
-          </a:prstGeom>
-        </p:spPr>
-      </p:pic>
-      <p:pic>
-        <p:nvPicPr>
           <p:cNvPr id="13" name="Picture 2" descr="SC"/>
           <p:cNvPicPr>
             <a:picLocks noChangeAspect="1" noChangeArrowheads="1"/>
@@ -6415,7 +6307,7 @@
           <p:nvPr/>
         </p:nvPicPr>
         <p:blipFill>
-          <a:blip r:embed="rId4">
+          <a:blip r:embed="rId2">
             <a:extLst>
               <a:ext uri="{28A0092B-C50C-407E-A947-70E740481C1C}">
                 <a14:useLocalDpi xmlns:a14="http://schemas.microsoft.com/office/drawing/2010/main" val="0"/>
@@ -6429,7 +6321,7 @@
         </p:blipFill>
         <p:spPr bwMode="auto">
           <a:xfrm>
-            <a:off x="6248766" y="4145510"/>
+            <a:off x="6240300" y="4164827"/>
             <a:ext cx="1628775" cy="706889"/>
           </a:xfrm>
           <a:prstGeom prst="rect">
@@ -6445,6 +6337,42 @@
               </a14:hiddenFill>
             </a:ext>
           </a:extLst>
+        </p:spPr>
+      </p:pic>
+      <p:pic>
+        <p:nvPicPr>
+          <p:cNvPr id="3" name="Picture 2">
+            <a:extLst>
+              <a:ext uri="{FF2B5EF4-FFF2-40B4-BE49-F238E27FC236}">
+                <a16:creationId xmlns:a16="http://schemas.microsoft.com/office/drawing/2014/main" id="{7AD5404A-B818-F945-BC01-8B0774EA6F19}"/>
+              </a:ext>
+            </a:extLst>
+          </p:cNvPr>
+          <p:cNvPicPr>
+            <a:picLocks noChangeAspect="1"/>
+          </p:cNvPicPr>
+          <p:nvPr/>
+        </p:nvPicPr>
+        <p:blipFill>
+          <a:blip r:embed="rId3">
+            <a:extLst>
+              <a:ext uri="{28A0092B-C50C-407E-A947-70E740481C1C}">
+                <a14:useLocalDpi xmlns:a14="http://schemas.microsoft.com/office/drawing/2010/main" val="0"/>
+              </a:ext>
+            </a:extLst>
+          </a:blip>
+          <a:stretch>
+            <a:fillRect/>
+          </a:stretch>
+        </p:blipFill>
+        <p:spPr>
+          <a:xfrm>
+            <a:off x="591802" y="4159950"/>
+            <a:ext cx="3112904" cy="759412"/>
+          </a:xfrm>
+          <a:prstGeom prst="rect">
+            <a:avLst/>
+          </a:prstGeom>
         </p:spPr>
       </p:pic>
     </p:spTree>
@@ -7007,7 +6935,7 @@
           <a:graphicData uri="http://schemas.openxmlformats.org/presentationml/2006/ole">
             <mc:AlternateContent xmlns:mc="http://schemas.openxmlformats.org/markup-compatibility/2006">
               <mc:Choice xmlns:v="urn:schemas-microsoft-com:vml" Requires="v">
-                <p:oleObj spid="_x0000_s1152" name="משוואה" r:id="rId3" imgW="6146640" imgH="812520" progId="Equation.3">
+                <p:oleObj spid="_x0000_s1156" name="משוואה" r:id="rId3" imgW="6146640" imgH="812520" progId="Equation.3">
                   <p:embed/>
                 </p:oleObj>
               </mc:Choice>
@@ -7108,7 +7036,7 @@
           <a:graphicData uri="http://schemas.openxmlformats.org/presentationml/2006/ole">
             <mc:AlternateContent xmlns:mc="http://schemas.openxmlformats.org/markup-compatibility/2006">
               <mc:Choice xmlns:v="urn:schemas-microsoft-com:vml" Requires="v">
-                <p:oleObj spid="_x0000_s1153" name="משוואה" r:id="rId5" imgW="279360" imgH="253800" progId="Equation.3">
+                <p:oleObj spid="_x0000_s1157" name="משוואה" r:id="rId5" imgW="279360" imgH="253800" progId="Equation.3">
                   <p:embed/>
                 </p:oleObj>
               </mc:Choice>

</xml_diff>